<commit_message>
eu sei que você veio até aqui para copiar meu projeto, kekekekeke
</commit_message>
<xml_diff>
--- a/lucas_comercio/e-Commerce - FINAL.pptx
+++ b/lucas_comercio/e-Commerce - FINAL.pptx
@@ -116,6 +116,22 @@
       </a:defRPr>
     </a:lvl9pPr>
   </p:defaultTextStyle>
+  <p:extLst>
+    <p:ext uri="{EFAFB233-063F-42B5-8137-9DF3F51BA10A}">
+      <p15:sldGuideLst xmlns:p15="http://schemas.microsoft.com/office/powerpoint/2012/main">
+        <p15:guide id="1" orient="horz" pos="2160">
+          <p15:clr>
+            <a:srgbClr val="A4A3A4"/>
+          </p15:clr>
+        </p15:guide>
+        <p15:guide id="2" pos="2880">
+          <p15:clr>
+            <a:srgbClr val="A4A3A4"/>
+          </p15:clr>
+        </p15:guide>
+      </p15:sldGuideLst>
+    </p:ext>
+  </p:extLst>
 </p:presentation>
 </file>
 
@@ -300,7 +316,7 @@
           <a:p>
             <a:fld id="{A5CADA9A-D82F-054D-9DE2-97667E10798B}" type="datetimeFigureOut">
               <a:rPr lang="en-US" smtClean="0"/>
-              <a:t>19/12/16</a:t>
+              <a:t>1/10/2017</a:t>
             </a:fld>
             <a:endParaRPr lang="pt-BR"/>
           </a:p>
@@ -342,7 +358,7 @@
           <a:p>
             <a:fld id="{991D1526-AA0A-814C-9BAA-F03B9FC42F9B}" type="slidenum">
               <a:rPr lang="pt-BR" smtClean="0"/>
-              <a:t>‹#›</a:t>
+              <a:t>‹nº›</a:t>
             </a:fld>
             <a:endParaRPr lang="pt-BR"/>
           </a:p>
@@ -470,7 +486,7 @@
           <a:p>
             <a:fld id="{A5CADA9A-D82F-054D-9DE2-97667E10798B}" type="datetimeFigureOut">
               <a:rPr lang="en-US" smtClean="0"/>
-              <a:t>19/12/16</a:t>
+              <a:t>1/10/2017</a:t>
             </a:fld>
             <a:endParaRPr lang="pt-BR"/>
           </a:p>
@@ -512,7 +528,7 @@
           <a:p>
             <a:fld id="{991D1526-AA0A-814C-9BAA-F03B9FC42F9B}" type="slidenum">
               <a:rPr lang="pt-BR" smtClean="0"/>
-              <a:t>‹#›</a:t>
+              <a:t>‹nº›</a:t>
             </a:fld>
             <a:endParaRPr lang="pt-BR"/>
           </a:p>
@@ -650,7 +666,7 @@
           <a:p>
             <a:fld id="{A5CADA9A-D82F-054D-9DE2-97667E10798B}" type="datetimeFigureOut">
               <a:rPr lang="en-US" smtClean="0"/>
-              <a:t>19/12/16</a:t>
+              <a:t>1/10/2017</a:t>
             </a:fld>
             <a:endParaRPr lang="pt-BR"/>
           </a:p>
@@ -692,7 +708,7 @@
           <a:p>
             <a:fld id="{991D1526-AA0A-814C-9BAA-F03B9FC42F9B}" type="slidenum">
               <a:rPr lang="pt-BR" smtClean="0"/>
-              <a:t>‹#›</a:t>
+              <a:t>‹nº›</a:t>
             </a:fld>
             <a:endParaRPr lang="pt-BR"/>
           </a:p>
@@ -820,7 +836,7 @@
           <a:p>
             <a:fld id="{A5CADA9A-D82F-054D-9DE2-97667E10798B}" type="datetimeFigureOut">
               <a:rPr lang="en-US" smtClean="0"/>
-              <a:t>19/12/16</a:t>
+              <a:t>1/10/2017</a:t>
             </a:fld>
             <a:endParaRPr lang="pt-BR"/>
           </a:p>
@@ -862,7 +878,7 @@
           <a:p>
             <a:fld id="{991D1526-AA0A-814C-9BAA-F03B9FC42F9B}" type="slidenum">
               <a:rPr lang="pt-BR" smtClean="0"/>
-              <a:t>‹#›</a:t>
+              <a:t>‹nº›</a:t>
             </a:fld>
             <a:endParaRPr lang="pt-BR"/>
           </a:p>
@@ -1066,7 +1082,7 @@
           <a:p>
             <a:fld id="{A5CADA9A-D82F-054D-9DE2-97667E10798B}" type="datetimeFigureOut">
               <a:rPr lang="en-US" smtClean="0"/>
-              <a:t>19/12/16</a:t>
+              <a:t>1/10/2017</a:t>
             </a:fld>
             <a:endParaRPr lang="pt-BR"/>
           </a:p>
@@ -1108,7 +1124,7 @@
           <a:p>
             <a:fld id="{991D1526-AA0A-814C-9BAA-F03B9FC42F9B}" type="slidenum">
               <a:rPr lang="pt-BR" smtClean="0"/>
-              <a:t>‹#›</a:t>
+              <a:t>‹nº›</a:t>
             </a:fld>
             <a:endParaRPr lang="pt-BR"/>
           </a:p>
@@ -1354,7 +1370,7 @@
           <a:p>
             <a:fld id="{A5CADA9A-D82F-054D-9DE2-97667E10798B}" type="datetimeFigureOut">
               <a:rPr lang="en-US" smtClean="0"/>
-              <a:t>19/12/16</a:t>
+              <a:t>1/10/2017</a:t>
             </a:fld>
             <a:endParaRPr lang="pt-BR"/>
           </a:p>
@@ -1396,7 +1412,7 @@
           <a:p>
             <a:fld id="{991D1526-AA0A-814C-9BAA-F03B9FC42F9B}" type="slidenum">
               <a:rPr lang="pt-BR" smtClean="0"/>
-              <a:t>‹#›</a:t>
+              <a:t>‹nº›</a:t>
             </a:fld>
             <a:endParaRPr lang="pt-BR"/>
           </a:p>
@@ -1776,7 +1792,7 @@
           <a:p>
             <a:fld id="{A5CADA9A-D82F-054D-9DE2-97667E10798B}" type="datetimeFigureOut">
               <a:rPr lang="en-US" smtClean="0"/>
-              <a:t>19/12/16</a:t>
+              <a:t>1/10/2017</a:t>
             </a:fld>
             <a:endParaRPr lang="pt-BR"/>
           </a:p>
@@ -1818,7 +1834,7 @@
           <a:p>
             <a:fld id="{991D1526-AA0A-814C-9BAA-F03B9FC42F9B}" type="slidenum">
               <a:rPr lang="pt-BR" smtClean="0"/>
-              <a:t>‹#›</a:t>
+              <a:t>‹nº›</a:t>
             </a:fld>
             <a:endParaRPr lang="pt-BR"/>
           </a:p>
@@ -1894,7 +1910,7 @@
           <a:p>
             <a:fld id="{A5CADA9A-D82F-054D-9DE2-97667E10798B}" type="datetimeFigureOut">
               <a:rPr lang="en-US" smtClean="0"/>
-              <a:t>19/12/16</a:t>
+              <a:t>1/10/2017</a:t>
             </a:fld>
             <a:endParaRPr lang="pt-BR"/>
           </a:p>
@@ -1936,7 +1952,7 @@
           <a:p>
             <a:fld id="{991D1526-AA0A-814C-9BAA-F03B9FC42F9B}" type="slidenum">
               <a:rPr lang="pt-BR" smtClean="0"/>
-              <a:t>‹#›</a:t>
+              <a:t>‹nº›</a:t>
             </a:fld>
             <a:endParaRPr lang="pt-BR"/>
           </a:p>
@@ -1989,7 +2005,7 @@
           <a:p>
             <a:fld id="{A5CADA9A-D82F-054D-9DE2-97667E10798B}" type="datetimeFigureOut">
               <a:rPr lang="en-US" smtClean="0"/>
-              <a:t>19/12/16</a:t>
+              <a:t>1/10/2017</a:t>
             </a:fld>
             <a:endParaRPr lang="pt-BR"/>
           </a:p>
@@ -2031,7 +2047,7 @@
           <a:p>
             <a:fld id="{991D1526-AA0A-814C-9BAA-F03B9FC42F9B}" type="slidenum">
               <a:rPr lang="pt-BR" smtClean="0"/>
-              <a:t>‹#›</a:t>
+              <a:t>‹nº›</a:t>
             </a:fld>
             <a:endParaRPr lang="pt-BR"/>
           </a:p>
@@ -2266,7 +2282,7 @@
           <a:p>
             <a:fld id="{A5CADA9A-D82F-054D-9DE2-97667E10798B}" type="datetimeFigureOut">
               <a:rPr lang="en-US" smtClean="0"/>
-              <a:t>19/12/16</a:t>
+              <a:t>1/10/2017</a:t>
             </a:fld>
             <a:endParaRPr lang="pt-BR"/>
           </a:p>
@@ -2308,7 +2324,7 @@
           <a:p>
             <a:fld id="{991D1526-AA0A-814C-9BAA-F03B9FC42F9B}" type="slidenum">
               <a:rPr lang="pt-BR" smtClean="0"/>
-              <a:t>‹#›</a:t>
+              <a:t>‹nº›</a:t>
             </a:fld>
             <a:endParaRPr lang="pt-BR"/>
           </a:p>
@@ -2519,7 +2535,7 @@
           <a:p>
             <a:fld id="{A5CADA9A-D82F-054D-9DE2-97667E10798B}" type="datetimeFigureOut">
               <a:rPr lang="en-US" smtClean="0"/>
-              <a:t>19/12/16</a:t>
+              <a:t>1/10/2017</a:t>
             </a:fld>
             <a:endParaRPr lang="pt-BR"/>
           </a:p>
@@ -2561,7 +2577,7 @@
           <a:p>
             <a:fld id="{991D1526-AA0A-814C-9BAA-F03B9FC42F9B}" type="slidenum">
               <a:rPr lang="pt-BR" smtClean="0"/>
-              <a:t>‹#›</a:t>
+              <a:t>‹nº›</a:t>
             </a:fld>
             <a:endParaRPr lang="pt-BR"/>
           </a:p>
@@ -2732,7 +2748,7 @@
           <a:p>
             <a:fld id="{A5CADA9A-D82F-054D-9DE2-97667E10798B}" type="datetimeFigureOut">
               <a:rPr lang="en-US" smtClean="0"/>
-              <a:t>19/12/16</a:t>
+              <a:t>1/10/2017</a:t>
             </a:fld>
             <a:endParaRPr lang="pt-BR"/>
           </a:p>
@@ -2810,7 +2826,7 @@
           <a:p>
             <a:fld id="{991D1526-AA0A-814C-9BAA-F03B9FC42F9B}" type="slidenum">
               <a:rPr lang="pt-BR" smtClean="0"/>
-              <a:t>‹#›</a:t>
+              <a:t>‹nº›</a:t>
             </a:fld>
             <a:endParaRPr lang="pt-BR"/>
           </a:p>
@@ -3131,11 +3147,7 @@
             </a:br>
             <a:r>
               <a:rPr lang="pt-BR" dirty="0" smtClean="0"/>
-              <a:t>Com</a:t>
-            </a:r>
-            <a:r>
-              <a:rPr lang="pt-BR" dirty="0" smtClean="0"/>
-              <a:t>ércio Eletrônico</a:t>
+              <a:t>Comércio Eletrônico</a:t>
             </a:r>
             <a:endParaRPr lang="pt-BR" dirty="0"/>
           </a:p>
@@ -3173,7 +3185,7 @@
   <p:timing>
     <p:tnLst>
       <p:par>
-        <p:cTn xmlns:p14="http://schemas.microsoft.com/office/powerpoint/2010/main" id="1" dur="indefinite" restart="never" nodeType="tmRoot"/>
+        <p:cTn id="1" dur="indefinite" restart="never" nodeType="tmRoot"/>
       </p:par>
     </p:tnLst>
   </p:timing>
@@ -3259,11 +3271,7 @@
           <a:p>
             <a:r>
               <a:rPr lang="pt-BR" dirty="0" smtClean="0"/>
-              <a:t>Gerar um boleto com as informa</a:t>
-            </a:r>
-            <a:r>
-              <a:rPr lang="pt-BR" dirty="0" smtClean="0"/>
-              <a:t>ções da conta para pagamento</a:t>
+              <a:t>Gerar um boleto com as informações da conta para pagamento</a:t>
             </a:r>
           </a:p>
           <a:p>
@@ -3352,11 +3360,7 @@
           <a:p>
             <a:r>
               <a:rPr lang="pt-BR" dirty="0" smtClean="0"/>
-              <a:t>Manter na </a:t>
-            </a:r>
-            <a:r>
-              <a:rPr lang="pt-BR" dirty="0" smtClean="0"/>
-              <a:t>área administrativa um resumo de todas as compras realizadas no site.</a:t>
+              <a:t>Manter na área administrativa um resumo de todas as compras realizadas no site.</a:t>
             </a:r>
           </a:p>
           <a:p>
@@ -3442,11 +3446,7 @@
           <a:p>
             <a:r>
               <a:rPr lang="pt-BR" dirty="0" smtClean="0"/>
-              <a:t>Essas s</a:t>
-            </a:r>
-            <a:r>
-              <a:rPr lang="pt-BR" dirty="0" smtClean="0"/>
-              <a:t>ão as implementações que devem ser entregues para conclusão do semestre.</a:t>
+              <a:t>Essas são as implementações que devem ser entregues para conclusão do semestre.</a:t>
             </a:r>
           </a:p>
           <a:p>
@@ -3520,38 +3520,30 @@
           <a:p>
             <a:r>
               <a:rPr lang="pt-BR" dirty="0" smtClean="0"/>
-              <a:t>Avalia</a:t>
-            </a:r>
+              <a:t>Avaliação</a:t>
+            </a:r>
+            <a:endParaRPr lang="pt-BR" dirty="0"/>
+          </a:p>
+        </p:txBody>
+      </p:sp>
+      <p:sp>
+        <p:nvSpPr>
+          <p:cNvPr id="3" name="Content Placeholder 2"/>
+          <p:cNvSpPr>
+            <a:spLocks noGrp="1"/>
+          </p:cNvSpPr>
+          <p:nvPr>
+            <p:ph idx="1"/>
+          </p:nvPr>
+        </p:nvSpPr>
+        <p:spPr/>
+        <p:txBody>
+          <a:bodyPr/>
+          <a:lstStyle/>
+          <a:p>
             <a:r>
               <a:rPr lang="pt-BR" dirty="0" smtClean="0"/>
-              <a:t>ção</a:t>
-            </a:r>
-            <a:endParaRPr lang="pt-BR" dirty="0"/>
-          </a:p>
-        </p:txBody>
-      </p:sp>
-      <p:sp>
-        <p:nvSpPr>
-          <p:cNvPr id="3" name="Content Placeholder 2"/>
-          <p:cNvSpPr>
-            <a:spLocks noGrp="1"/>
-          </p:cNvSpPr>
-          <p:nvPr>
-            <p:ph idx="1"/>
-          </p:nvPr>
-        </p:nvSpPr>
-        <p:spPr/>
-        <p:txBody>
-          <a:bodyPr/>
-          <a:lstStyle/>
-          <a:p>
-            <a:r>
-              <a:rPr lang="pt-BR" dirty="0" smtClean="0"/>
-              <a:t>Como o sistema vem sendo desenvolvido ao longo do semestre a reavalia</a:t>
-            </a:r>
-            <a:r>
-              <a:rPr lang="pt-BR" dirty="0" smtClean="0"/>
-              <a:t>ção será um prazo maior para a entrega/apresentação do trabalho.</a:t>
+              <a:t>Como o sistema vem sendo desenvolvido ao longo do semestre a reavaliação será um prazo maior para a entrega/apresentação do trabalho.</a:t>
             </a:r>
           </a:p>
           <a:p>
@@ -3641,17 +3633,18 @@
           <a:p>
             <a:r>
               <a:rPr lang="pt-BR" dirty="0" smtClean="0"/>
-              <a:t>Carrinho de Compras</a:t>
-            </a:r>
-          </a:p>
-          <a:p>
+              <a:t>Carrinho de </a:t>
+            </a:r>
             <a:r>
               <a:rPr lang="pt-BR" dirty="0" smtClean="0"/>
-              <a:t>Identifica</a:t>
-            </a:r>
+              <a:t>Compras - Feito</a:t>
+            </a:r>
+            <a:endParaRPr lang="pt-BR" dirty="0" smtClean="0"/>
+          </a:p>
+          <a:p>
             <a:r>
               <a:rPr lang="pt-BR" dirty="0" smtClean="0"/>
-              <a:t>ção</a:t>
+              <a:t>Identificação - Feito</a:t>
             </a:r>
             <a:endParaRPr lang="pt-BR" dirty="0" smtClean="0"/>
           </a:p>
@@ -3660,6 +3653,11 @@
               <a:rPr lang="pt-BR" dirty="0" smtClean="0"/>
               <a:t>Resumo do Pedido </a:t>
             </a:r>
+            <a:r>
+              <a:rPr lang="pt-BR" dirty="0" smtClean="0"/>
+              <a:t>- Feito</a:t>
+            </a:r>
+            <a:endParaRPr lang="pt-BR" dirty="0" smtClean="0"/>
           </a:p>
           <a:p>
             <a:r>
@@ -3689,7 +3687,7 @@
   <p:timing>
     <p:tnLst>
       <p:par>
-        <p:cTn xmlns:p14="http://schemas.microsoft.com/office/powerpoint/2010/main" id="1" dur="indefinite" restart="never" nodeType="tmRoot"/>
+        <p:cTn id="1" dur="indefinite" restart="never" nodeType="tmRoot"/>
       </p:par>
     </p:tnLst>
   </p:timing>
@@ -3791,7 +3789,7 @@
   <p:timing>
     <p:tnLst>
       <p:par>
-        <p:cTn xmlns:p14="http://schemas.microsoft.com/office/powerpoint/2010/main" id="1" dur="indefinite" restart="never" nodeType="tmRoot"/>
+        <p:cTn id="1" dur="indefinite" restart="never" nodeType="tmRoot"/>
       </p:par>
     </p:tnLst>
   </p:timing>
@@ -3832,11 +3830,7 @@
           <a:p>
             <a:r>
               <a:rPr lang="pt-BR" dirty="0" smtClean="0"/>
-              <a:t>Identifica</a:t>
-            </a:r>
-            <a:r>
-              <a:rPr lang="pt-BR" dirty="0" smtClean="0"/>
-              <a:t>ção</a:t>
+              <a:t>Identificação</a:t>
             </a:r>
             <a:endParaRPr lang="pt-BR" dirty="0"/>
           </a:p>
@@ -3873,11 +3867,7 @@
           <a:p>
             <a:r>
               <a:rPr lang="pt-BR" dirty="0" smtClean="0"/>
-              <a:t>No pr</a:t>
-            </a:r>
-            <a:r>
-              <a:rPr lang="pt-BR" dirty="0" smtClean="0"/>
-              <a:t>óximo slide é apresentado o exemplo da tela do KABUM.  A proposta é semelhante, o que muda é o campo.</a:t>
+              <a:t>No próximo slide é apresentado o exemplo da tela do KABUM.  A proposta é semelhante, o que muda é o campo.</a:t>
             </a:r>
           </a:p>
           <a:p>
@@ -3902,7 +3892,7 @@
   <p:timing>
     <p:tnLst>
       <p:par>
-        <p:cTn xmlns:p14="http://schemas.microsoft.com/office/powerpoint/2010/main" id="1" dur="indefinite" restart="never" nodeType="tmRoot"/>
+        <p:cTn id="1" dur="indefinite" restart="never" nodeType="tmRoot"/>
       </p:par>
     </p:tnLst>
   </p:timing>
@@ -3943,11 +3933,7 @@
           <a:p>
             <a:r>
               <a:rPr lang="pt-BR" dirty="0" smtClean="0"/>
-              <a:t>Identifica</a:t>
-            </a:r>
-            <a:r>
-              <a:rPr lang="pt-BR" dirty="0" smtClean="0"/>
-              <a:t>ção </a:t>
+              <a:t>Identificação </a:t>
             </a:r>
             <a:r>
               <a:rPr lang="en-US" dirty="0" smtClean="0"/>
@@ -4074,7 +4060,7 @@
   <p:timing>
     <p:tnLst>
       <p:par>
-        <p:cTn xmlns:p14="http://schemas.microsoft.com/office/powerpoint/2010/main" id="1" dur="indefinite" restart="never" nodeType="tmRoot"/>
+        <p:cTn id="1" dur="indefinite" restart="never" nodeType="tmRoot"/>
       </p:par>
     </p:tnLst>
   </p:timing>
@@ -4140,11 +4126,7 @@
           <a:p>
             <a:r>
               <a:rPr lang="pt-BR" dirty="0" smtClean="0"/>
-              <a:t>Nessa tela deve aparecer todas as informa</a:t>
-            </a:r>
-            <a:r>
-              <a:rPr lang="pt-BR" dirty="0" smtClean="0"/>
-              <a:t>ções do pedido. A descrição, quantidade, preço unitário e preço total de cada produto, o total do pedido e o endereço de entrega do produto (o mesmo do cliente) e um botão finalizar pedido.</a:t>
+              <a:t>Nessa tela deve aparecer todas as informações do pedido. A descrição, quantidade, preço unitário e preço total de cada produto, o total do pedido e o endereço de entrega do produto (o mesmo do cliente) e um botão finalizar pedido.</a:t>
             </a:r>
           </a:p>
           <a:p>
@@ -4171,7 +4153,7 @@
   <p:timing>
     <p:tnLst>
       <p:par>
-        <p:cTn xmlns:p14="http://schemas.microsoft.com/office/powerpoint/2010/main" id="1" dur="indefinite" restart="never" nodeType="tmRoot"/>
+        <p:cTn id="1" dur="indefinite" restart="never" nodeType="tmRoot"/>
       </p:par>
     </p:tnLst>
   </p:timing>
@@ -4235,11 +4217,7 @@
           <a:p>
             <a:r>
               <a:rPr lang="pt-BR" dirty="0" smtClean="0"/>
-              <a:t>Visualmente essa tela s</a:t>
-            </a:r>
-            <a:r>
-              <a:rPr lang="pt-BR" dirty="0" smtClean="0"/>
-              <a:t>ó terá uma mensagem de pedido realizado com sucesso e um link para abrir o boleto.</a:t>
+              <a:t>Visualmente essa tela só terá uma mensagem de pedido realizado com sucesso e um link para abrir o boleto.</a:t>
             </a:r>
           </a:p>
           <a:p>
@@ -4272,7 +4250,7 @@
   <p:timing>
     <p:tnLst>
       <p:par>
-        <p:cTn xmlns:p14="http://schemas.microsoft.com/office/powerpoint/2010/main" id="1" dur="indefinite" restart="never" nodeType="tmRoot"/>
+        <p:cTn id="1" dur="indefinite" restart="never" nodeType="tmRoot"/>
       </p:par>
     </p:tnLst>
   </p:timing>
@@ -4632,7 +4610,7 @@
   <p:timing>
     <p:tnLst>
       <p:par>
-        <p:cTn xmlns:p14="http://schemas.microsoft.com/office/powerpoint/2010/main" id="1" dur="indefinite" restart="never" nodeType="tmRoot"/>
+        <p:cTn id="1" dur="indefinite" restart="never" nodeType="tmRoot"/>
       </p:par>
     </p:tnLst>
   </p:timing>
@@ -4696,11 +4674,7 @@
           <a:p>
             <a:r>
               <a:rPr lang="pt-BR" dirty="0" smtClean="0"/>
-              <a:t>Depois de gravar na tabela venda devemos pegar o c</a:t>
-            </a:r>
-            <a:r>
-              <a:rPr lang="pt-BR" dirty="0" smtClean="0"/>
-              <a:t>ódigo do pedido gravado (explicarei em aula como faz) e gravar, para cada item do carrinho, as informações na tabela  </a:t>
+              <a:t>Depois de gravar na tabela venda devemos pegar o código do pedido gravado (explicarei em aula como faz) e gravar, para cada item do carrinho, as informações na tabela  </a:t>
             </a:r>
             <a:r>
               <a:rPr lang="pt-BR" dirty="0" err="1" smtClean="0"/>

</xml_diff>